<commit_message>
big update these jenny
aggiunto tutto (spero) quello che mancava
</commit_message>
<xml_diff>
--- a/jenny_CMF/graphs/Boxplot age vs ODF prechir.pptx
+++ b/jenny_CMF/graphs/Boxplot age vs ODF prechir.pptx
@@ -2307,20 +2307,20 @@
           <p:spPr>
             <a:xfrm>
               <a:off x="884169" y="5524507"/>
-              <a:ext cx="7726715" cy="0"/>
+              <a:ext cx="6542363" cy="0"/>
             </a:xfrm>
             <a:custGeom>
               <a:avLst/>
               <a:pathLst>
-                <a:path w="7726715" h="0">
+                <a:path w="6542363" h="0">
                   <a:moveTo>
                     <a:pt x="0" y="0"/>
                   </a:moveTo>
                   <a:lnTo>
-                    <a:pt x="7726715" y="0"/>
-                  </a:lnTo>
-                  <a:lnTo>
-                    <a:pt x="7726715" y="0"/>
+                    <a:pt x="6542363" y="0"/>
+                  </a:lnTo>
+                  <a:lnTo>
+                    <a:pt x="6542363" y="0"/>
                   </a:lnTo>
                 </a:path>
               </a:pathLst>
@@ -2350,20 +2350,20 @@
           <p:spPr>
             <a:xfrm>
               <a:off x="884169" y="5247872"/>
-              <a:ext cx="7726715" cy="0"/>
+              <a:ext cx="6542363" cy="0"/>
             </a:xfrm>
             <a:custGeom>
               <a:avLst/>
               <a:pathLst>
-                <a:path w="7726715" h="0">
+                <a:path w="6542363" h="0">
                   <a:moveTo>
                     <a:pt x="0" y="0"/>
                   </a:moveTo>
                   <a:lnTo>
-                    <a:pt x="7726715" y="0"/>
-                  </a:lnTo>
-                  <a:lnTo>
-                    <a:pt x="7726715" y="0"/>
+                    <a:pt x="6542363" y="0"/>
+                  </a:lnTo>
+                  <a:lnTo>
+                    <a:pt x="6542363" y="0"/>
                   </a:lnTo>
                 </a:path>
               </a:pathLst>
@@ -2393,20 +2393,20 @@
           <p:spPr>
             <a:xfrm>
               <a:off x="884169" y="4971236"/>
-              <a:ext cx="7726715" cy="0"/>
+              <a:ext cx="6542363" cy="0"/>
             </a:xfrm>
             <a:custGeom>
               <a:avLst/>
               <a:pathLst>
-                <a:path w="7726715" h="0">
+                <a:path w="6542363" h="0">
                   <a:moveTo>
                     <a:pt x="0" y="0"/>
                   </a:moveTo>
                   <a:lnTo>
-                    <a:pt x="7726715" y="0"/>
-                  </a:lnTo>
-                  <a:lnTo>
-                    <a:pt x="7726715" y="0"/>
+                    <a:pt x="6542363" y="0"/>
+                  </a:lnTo>
+                  <a:lnTo>
+                    <a:pt x="6542363" y="0"/>
                   </a:lnTo>
                 </a:path>
               </a:pathLst>
@@ -2436,20 +2436,20 @@
           <p:spPr>
             <a:xfrm>
               <a:off x="884169" y="4694601"/>
-              <a:ext cx="7726715" cy="0"/>
+              <a:ext cx="6542363" cy="0"/>
             </a:xfrm>
             <a:custGeom>
               <a:avLst/>
               <a:pathLst>
-                <a:path w="7726715" h="0">
+                <a:path w="6542363" h="0">
                   <a:moveTo>
                     <a:pt x="0" y="0"/>
                   </a:moveTo>
                   <a:lnTo>
-                    <a:pt x="7726715" y="0"/>
-                  </a:lnTo>
-                  <a:lnTo>
-                    <a:pt x="7726715" y="0"/>
+                    <a:pt x="6542363" y="0"/>
+                  </a:lnTo>
+                  <a:lnTo>
+                    <a:pt x="6542363" y="0"/>
                   </a:lnTo>
                 </a:path>
               </a:pathLst>
@@ -2479,20 +2479,20 @@
           <p:spPr>
             <a:xfrm>
               <a:off x="884169" y="4417965"/>
-              <a:ext cx="7726715" cy="0"/>
+              <a:ext cx="6542363" cy="0"/>
             </a:xfrm>
             <a:custGeom>
               <a:avLst/>
               <a:pathLst>
-                <a:path w="7726715" h="0">
+                <a:path w="6542363" h="0">
                   <a:moveTo>
                     <a:pt x="0" y="0"/>
                   </a:moveTo>
                   <a:lnTo>
-                    <a:pt x="7726715" y="0"/>
-                  </a:lnTo>
-                  <a:lnTo>
-                    <a:pt x="7726715" y="0"/>
+                    <a:pt x="6542363" y="0"/>
+                  </a:lnTo>
+                  <a:lnTo>
+                    <a:pt x="6542363" y="0"/>
                   </a:lnTo>
                 </a:path>
               </a:pathLst>
@@ -2522,20 +2522,20 @@
           <p:spPr>
             <a:xfrm>
               <a:off x="884169" y="4141330"/>
-              <a:ext cx="7726715" cy="0"/>
+              <a:ext cx="6542363" cy="0"/>
             </a:xfrm>
             <a:custGeom>
               <a:avLst/>
               <a:pathLst>
-                <a:path w="7726715" h="0">
+                <a:path w="6542363" h="0">
                   <a:moveTo>
                     <a:pt x="0" y="0"/>
                   </a:moveTo>
                   <a:lnTo>
-                    <a:pt x="7726715" y="0"/>
-                  </a:lnTo>
-                  <a:lnTo>
-                    <a:pt x="7726715" y="0"/>
+                    <a:pt x="6542363" y="0"/>
+                  </a:lnTo>
+                  <a:lnTo>
+                    <a:pt x="6542363" y="0"/>
                   </a:lnTo>
                 </a:path>
               </a:pathLst>
@@ -2565,20 +2565,20 @@
           <p:spPr>
             <a:xfrm>
               <a:off x="884169" y="3864695"/>
-              <a:ext cx="7726715" cy="0"/>
+              <a:ext cx="6542363" cy="0"/>
             </a:xfrm>
             <a:custGeom>
               <a:avLst/>
               <a:pathLst>
-                <a:path w="7726715" h="0">
+                <a:path w="6542363" h="0">
                   <a:moveTo>
                     <a:pt x="0" y="0"/>
                   </a:moveTo>
                   <a:lnTo>
-                    <a:pt x="7726715" y="0"/>
-                  </a:lnTo>
-                  <a:lnTo>
-                    <a:pt x="7726715" y="0"/>
+                    <a:pt x="6542363" y="0"/>
+                  </a:lnTo>
+                  <a:lnTo>
+                    <a:pt x="6542363" y="0"/>
                   </a:lnTo>
                 </a:path>
               </a:pathLst>
@@ -2608,20 +2608,20 @@
           <p:spPr>
             <a:xfrm>
               <a:off x="884169" y="3588059"/>
-              <a:ext cx="7726715" cy="0"/>
+              <a:ext cx="6542363" cy="0"/>
             </a:xfrm>
             <a:custGeom>
               <a:avLst/>
               <a:pathLst>
-                <a:path w="7726715" h="0">
+                <a:path w="6542363" h="0">
                   <a:moveTo>
                     <a:pt x="0" y="0"/>
                   </a:moveTo>
                   <a:lnTo>
-                    <a:pt x="7726715" y="0"/>
-                  </a:lnTo>
-                  <a:lnTo>
-                    <a:pt x="7726715" y="0"/>
+                    <a:pt x="6542363" y="0"/>
+                  </a:lnTo>
+                  <a:lnTo>
+                    <a:pt x="6542363" y="0"/>
                   </a:lnTo>
                 </a:path>
               </a:pathLst>
@@ -2651,20 +2651,20 @@
           <p:spPr>
             <a:xfrm>
               <a:off x="884169" y="3311424"/>
-              <a:ext cx="7726715" cy="0"/>
+              <a:ext cx="6542363" cy="0"/>
             </a:xfrm>
             <a:custGeom>
               <a:avLst/>
               <a:pathLst>
-                <a:path w="7726715" h="0">
+                <a:path w="6542363" h="0">
                   <a:moveTo>
                     <a:pt x="0" y="0"/>
                   </a:moveTo>
                   <a:lnTo>
-                    <a:pt x="7726715" y="0"/>
-                  </a:lnTo>
-                  <a:lnTo>
-                    <a:pt x="7726715" y="0"/>
+                    <a:pt x="6542363" y="0"/>
+                  </a:lnTo>
+                  <a:lnTo>
+                    <a:pt x="6542363" y="0"/>
                   </a:lnTo>
                 </a:path>
               </a:pathLst>
@@ -2694,20 +2694,20 @@
           <p:spPr>
             <a:xfrm>
               <a:off x="884169" y="3034789"/>
-              <a:ext cx="7726715" cy="0"/>
+              <a:ext cx="6542363" cy="0"/>
             </a:xfrm>
             <a:custGeom>
               <a:avLst/>
               <a:pathLst>
-                <a:path w="7726715" h="0">
+                <a:path w="6542363" h="0">
                   <a:moveTo>
                     <a:pt x="0" y="0"/>
                   </a:moveTo>
                   <a:lnTo>
-                    <a:pt x="7726715" y="0"/>
-                  </a:lnTo>
-                  <a:lnTo>
-                    <a:pt x="7726715" y="0"/>
+                    <a:pt x="6542363" y="0"/>
+                  </a:lnTo>
+                  <a:lnTo>
+                    <a:pt x="6542363" y="0"/>
                   </a:lnTo>
                 </a:path>
               </a:pathLst>
@@ -2737,20 +2737,20 @@
           <p:spPr>
             <a:xfrm>
               <a:off x="884169" y="2758153"/>
-              <a:ext cx="7726715" cy="0"/>
+              <a:ext cx="6542363" cy="0"/>
             </a:xfrm>
             <a:custGeom>
               <a:avLst/>
               <a:pathLst>
-                <a:path w="7726715" h="0">
+                <a:path w="6542363" h="0">
                   <a:moveTo>
                     <a:pt x="0" y="0"/>
                   </a:moveTo>
                   <a:lnTo>
-                    <a:pt x="7726715" y="0"/>
-                  </a:lnTo>
-                  <a:lnTo>
-                    <a:pt x="7726715" y="0"/>
+                    <a:pt x="6542363" y="0"/>
+                  </a:lnTo>
+                  <a:lnTo>
+                    <a:pt x="6542363" y="0"/>
                   </a:lnTo>
                 </a:path>
               </a:pathLst>
@@ -2780,20 +2780,20 @@
           <p:spPr>
             <a:xfrm>
               <a:off x="884169" y="2481518"/>
-              <a:ext cx="7726715" cy="0"/>
+              <a:ext cx="6542363" cy="0"/>
             </a:xfrm>
             <a:custGeom>
               <a:avLst/>
               <a:pathLst>
-                <a:path w="7726715" h="0">
+                <a:path w="6542363" h="0">
                   <a:moveTo>
                     <a:pt x="0" y="0"/>
                   </a:moveTo>
                   <a:lnTo>
-                    <a:pt x="7726715" y="0"/>
-                  </a:lnTo>
-                  <a:lnTo>
-                    <a:pt x="7726715" y="0"/>
+                    <a:pt x="6542363" y="0"/>
+                  </a:lnTo>
+                  <a:lnTo>
+                    <a:pt x="6542363" y="0"/>
                   </a:lnTo>
                 </a:path>
               </a:pathLst>
@@ -2823,20 +2823,20 @@
           <p:spPr>
             <a:xfrm>
               <a:off x="884169" y="2204883"/>
-              <a:ext cx="7726715" cy="0"/>
+              <a:ext cx="6542363" cy="0"/>
             </a:xfrm>
             <a:custGeom>
               <a:avLst/>
               <a:pathLst>
-                <a:path w="7726715" h="0">
+                <a:path w="6542363" h="0">
                   <a:moveTo>
                     <a:pt x="0" y="0"/>
                   </a:moveTo>
                   <a:lnTo>
-                    <a:pt x="7726715" y="0"/>
-                  </a:lnTo>
-                  <a:lnTo>
-                    <a:pt x="7726715" y="0"/>
+                    <a:pt x="6542363" y="0"/>
+                  </a:lnTo>
+                  <a:lnTo>
+                    <a:pt x="6542363" y="0"/>
                   </a:lnTo>
                 </a:path>
               </a:pathLst>
@@ -2866,20 +2866,20 @@
           <p:spPr>
             <a:xfrm>
               <a:off x="884169" y="1928247"/>
-              <a:ext cx="7726715" cy="0"/>
+              <a:ext cx="6542363" cy="0"/>
             </a:xfrm>
             <a:custGeom>
               <a:avLst/>
               <a:pathLst>
-                <a:path w="7726715" h="0">
+                <a:path w="6542363" h="0">
                   <a:moveTo>
                     <a:pt x="0" y="0"/>
                   </a:moveTo>
                   <a:lnTo>
-                    <a:pt x="7726715" y="0"/>
-                  </a:lnTo>
-                  <a:lnTo>
-                    <a:pt x="7726715" y="0"/>
+                    <a:pt x="6542363" y="0"/>
+                  </a:lnTo>
+                  <a:lnTo>
+                    <a:pt x="6542363" y="0"/>
                   </a:lnTo>
                 </a:path>
               </a:pathLst>
@@ -2908,7 +2908,7 @@
           </p:nvSpPr>
           <p:spPr>
             <a:xfrm>
-              <a:off x="2966629" y="2848592"/>
+              <a:off x="2643624" y="2848592"/>
               <a:ext cx="49651" cy="49651"/>
             </a:xfrm>
             <a:prstGeom prst="ellipse">
@@ -2943,7 +2943,7 @@
           </p:nvSpPr>
           <p:spPr>
             <a:xfrm>
-              <a:off x="2966629" y="2687222"/>
+              <a:off x="2643624" y="2687222"/>
               <a:ext cx="49651" cy="49651"/>
             </a:xfrm>
             <a:prstGeom prst="ellipse">
@@ -2978,7 +2978,7 @@
           </p:nvSpPr>
           <p:spPr>
             <a:xfrm>
-              <a:off x="2966629" y="3148280"/>
+              <a:off x="2643624" y="3148280"/>
               <a:ext cx="49651" cy="49651"/>
             </a:xfrm>
             <a:prstGeom prst="ellipse">
@@ -3013,7 +3013,7 @@
           </p:nvSpPr>
           <p:spPr>
             <a:xfrm>
-              <a:off x="2966629" y="3194386"/>
+              <a:off x="2643624" y="3194386"/>
               <a:ext cx="49651" cy="49651"/>
             </a:xfrm>
             <a:prstGeom prst="ellipse">
@@ -3048,7 +3048,7 @@
           </p:nvSpPr>
           <p:spPr>
             <a:xfrm>
-              <a:off x="2966629" y="3125228"/>
+              <a:off x="2643624" y="3125228"/>
               <a:ext cx="49651" cy="49651"/>
             </a:xfrm>
             <a:prstGeom prst="ellipse">
@@ -3083,7 +3083,7 @@
           </p:nvSpPr>
           <p:spPr>
             <a:xfrm>
-              <a:off x="2991455" y="3657218"/>
+              <a:off x="2668450" y="3657218"/>
               <a:ext cx="0" cy="887538"/>
             </a:xfrm>
             <a:custGeom>
@@ -3123,7 +3123,7 @@
           </p:nvSpPr>
           <p:spPr>
             <a:xfrm>
-              <a:off x="2991455" y="5190239"/>
+              <a:off x="2668450" y="5190239"/>
               <a:ext cx="0" cy="357320"/>
             </a:xfrm>
             <a:custGeom>
@@ -3163,13 +3163,13 @@
           </p:nvSpPr>
           <p:spPr>
             <a:xfrm>
-              <a:off x="1674401" y="4544757"/>
-              <a:ext cx="2634107" cy="645482"/>
+              <a:off x="1553274" y="4544757"/>
+              <a:ext cx="2230351" cy="645482"/>
             </a:xfrm>
             <a:custGeom>
               <a:avLst/>
               <a:pathLst>
-                <a:path w="2634107" h="645482">
+                <a:path w="2230351" h="645482">
                   <a:moveTo>
                     <a:pt x="0" y="0"/>
                   </a:moveTo>
@@ -3177,17 +3177,17 @@
                     <a:pt x="0" y="645482"/>
                   </a:lnTo>
                   <a:lnTo>
-                    <a:pt x="2634107" y="645482"/>
-                  </a:lnTo>
-                  <a:lnTo>
-                    <a:pt x="2634107" y="0"/>
+                    <a:pt x="2230351" y="645482"/>
+                  </a:lnTo>
+                  <a:lnTo>
+                    <a:pt x="2230351" y="0"/>
                   </a:lnTo>
                   <a:close/>
                 </a:path>
               </a:pathLst>
             </a:custGeom>
             <a:solidFill>
-              <a:srgbClr val="FFFFFF">
+              <a:srgbClr val="F8766D">
                 <a:alpha val="100000"/>
               </a:srgbClr>
             </a:solidFill>
@@ -3215,18 +3215,18 @@
           </p:nvSpPr>
           <p:spPr>
             <a:xfrm>
-              <a:off x="1674401" y="4994289"/>
-              <a:ext cx="2634107" cy="0"/>
+              <a:off x="1553274" y="4994289"/>
+              <a:ext cx="2230351" cy="0"/>
             </a:xfrm>
             <a:custGeom>
               <a:avLst/>
               <a:pathLst>
-                <a:path w="2634107" h="0">
+                <a:path w="2230351" h="0">
                   <a:moveTo>
                     <a:pt x="0" y="0"/>
                   </a:moveTo>
                   <a:lnTo>
-                    <a:pt x="2634107" y="0"/>
+                    <a:pt x="2230351" y="0"/>
                   </a:lnTo>
                 </a:path>
               </a:pathLst>
@@ -3255,7 +3255,7 @@
           </p:nvSpPr>
           <p:spPr>
             <a:xfrm>
-              <a:off x="6478772" y="2064792"/>
+              <a:off x="5617426" y="2064792"/>
               <a:ext cx="49651" cy="49651"/>
             </a:xfrm>
             <a:prstGeom prst="ellipse">
@@ -3290,7 +3290,7 @@
           </p:nvSpPr>
           <p:spPr>
             <a:xfrm>
-              <a:off x="6503598" y="2135724"/>
+              <a:off x="5642252" y="2135724"/>
               <a:ext cx="0" cy="1486914"/>
             </a:xfrm>
             <a:custGeom>
@@ -3330,7 +3330,7 @@
           </p:nvSpPr>
           <p:spPr>
             <a:xfrm>
-              <a:off x="6503598" y="4636968"/>
+              <a:off x="5642252" y="4636968"/>
               <a:ext cx="0" cy="587850"/>
             </a:xfrm>
             <a:custGeom>
@@ -3370,13 +3370,13 @@
           </p:nvSpPr>
           <p:spPr>
             <a:xfrm>
-              <a:off x="5186544" y="3622639"/>
-              <a:ext cx="2634107" cy="1014329"/>
+              <a:off x="4527076" y="3622639"/>
+              <a:ext cx="2230351" cy="1014329"/>
             </a:xfrm>
             <a:custGeom>
               <a:avLst/>
               <a:pathLst>
-                <a:path w="2634107" h="1014329">
+                <a:path w="2230351" h="1014329">
                   <a:moveTo>
                     <a:pt x="0" y="0"/>
                   </a:moveTo>
@@ -3384,17 +3384,17 @@
                     <a:pt x="0" y="1014329"/>
                   </a:lnTo>
                   <a:lnTo>
-                    <a:pt x="2634107" y="1014329"/>
-                  </a:lnTo>
-                  <a:lnTo>
-                    <a:pt x="2634107" y="0"/>
+                    <a:pt x="2230351" y="1014329"/>
+                  </a:lnTo>
+                  <a:lnTo>
+                    <a:pt x="2230351" y="0"/>
                   </a:lnTo>
                   <a:close/>
                 </a:path>
               </a:pathLst>
             </a:custGeom>
             <a:solidFill>
-              <a:srgbClr val="FFFFFF">
+              <a:srgbClr val="00BFC4">
                 <a:alpha val="100000"/>
               </a:srgbClr>
             </a:solidFill>
@@ -3422,18 +3422,18 @@
           </p:nvSpPr>
           <p:spPr>
             <a:xfrm>
-              <a:off x="5186544" y="4141330"/>
-              <a:ext cx="2634107" cy="0"/>
+              <a:off x="4527076" y="4141330"/>
+              <a:ext cx="2230351" cy="0"/>
             </a:xfrm>
             <a:custGeom>
               <a:avLst/>
               <a:pathLst>
-                <a:path w="2634107" h="0">
+                <a:path w="2230351" h="0">
                   <a:moveTo>
                     <a:pt x="0" y="0"/>
                   </a:moveTo>
                   <a:lnTo>
-                    <a:pt x="2634107" y="0"/>
+                    <a:pt x="2230351" y="0"/>
                   </a:lnTo>
                 </a:path>
               </a:pathLst>
@@ -4707,17 +4707,17 @@
           <p:spPr>
             <a:xfrm>
               <a:off x="884169" y="5720457"/>
-              <a:ext cx="7726715" cy="0"/>
+              <a:ext cx="6542363" cy="0"/>
             </a:xfrm>
             <a:custGeom>
               <a:avLst/>
               <a:pathLst>
-                <a:path w="7726715" h="0">
+                <a:path w="6542363" h="0">
                   <a:moveTo>
                     <a:pt x="0" y="0"/>
                   </a:moveTo>
                   <a:lnTo>
-                    <a:pt x="7726715" y="0"/>
+                    <a:pt x="6542363" y="0"/>
                   </a:lnTo>
                 </a:path>
               </a:pathLst>
@@ -4746,7 +4746,7 @@
           </p:nvSpPr>
           <p:spPr>
             <a:xfrm>
-              <a:off x="2991455" y="5720457"/>
+              <a:off x="2668450" y="5720457"/>
               <a:ext cx="0" cy="37957"/>
             </a:xfrm>
             <a:custGeom>
@@ -4786,7 +4786,7 @@
           </p:nvSpPr>
           <p:spPr>
             <a:xfrm>
-              <a:off x="6503598" y="5720457"/>
+              <a:off x="5642252" y="5720457"/>
               <a:ext cx="0" cy="37957"/>
             </a:xfrm>
             <a:custGeom>
@@ -4826,7 +4826,7 @@
           </p:nvSpPr>
           <p:spPr>
             <a:xfrm>
-              <a:off x="2959671" y="5787051"/>
+              <a:off x="2636666" y="5787051"/>
               <a:ext cx="63568" cy="83548"/>
             </a:xfrm>
             <a:prstGeom prst="rect">
@@ -4872,7 +4872,7 @@
           </p:nvSpPr>
           <p:spPr>
             <a:xfrm>
-              <a:off x="6471814" y="5788446"/>
+              <a:off x="5610467" y="5788446"/>
               <a:ext cx="63568" cy="82153"/>
             </a:xfrm>
             <a:prstGeom prst="rect">
@@ -4918,8 +4918,8 @@
           </p:nvSpPr>
           <p:spPr>
             <a:xfrm>
-              <a:off x="4179499" y="5904334"/>
-              <a:ext cx="1136054" cy="119186"/>
+              <a:off x="3442619" y="5906008"/>
+              <a:ext cx="1425463" cy="117512"/>
             </a:xfrm>
             <a:prstGeom prst="rect">
               <a:avLst/>
@@ -4951,7 +4951,7 @@
                   <a:latin typeface="Arial"/>
                   <a:cs typeface="Arial"/>
                 </a:rPr>
-                <a:t>factor(odf_prechir)</a:t>
+                <a:t>Traitement ODf pre-chir</a:t>
               </a:r>
             </a:p>
           </p:txBody>
@@ -4964,8 +4964,8 @@
           </p:nvSpPr>
           <p:spPr>
             <a:xfrm rot="-5400000">
-              <a:off x="467568" y="3771553"/>
-              <a:ext cx="218839" cy="94071"/>
+              <a:off x="445244" y="3759771"/>
+              <a:ext cx="239923" cy="117636"/>
             </a:xfrm>
             <a:prstGeom prst="rect">
               <a:avLst/>
@@ -4997,14 +4997,549 @@
                   <a:latin typeface="Arial"/>
                   <a:cs typeface="Arial"/>
                 </a:rPr>
-                <a:t>age</a:t>
+                <a:t>Age</a:t>
               </a:r>
             </a:p>
           </p:txBody>
         </p:sp>
         <p:sp>
           <p:nvSpPr>
-            <p:cNvPr id="69" name="tx69"/>
+            <p:cNvPr id="69" name="rc69"/>
+            <p:cNvSpPr/>
+            <p:nvPr/>
+          </p:nvSpPr>
+          <p:spPr>
+            <a:xfrm>
+              <a:off x="7578363" y="3414678"/>
+              <a:ext cx="1032521" cy="807821"/>
+            </a:xfrm>
+            <a:prstGeom prst="rect">
+              <a:avLst/>
+            </a:prstGeom>
+            <a:solidFill>
+              <a:srgbClr val="FFFFFF">
+                <a:alpha val="100000"/>
+              </a:srgbClr>
+            </a:solidFill>
+            <a:ln w="14782" cap="rnd">
+              <a:solidFill>
+                <a:srgbClr val="000000">
+                  <a:alpha val="100000"/>
+                </a:srgbClr>
+              </a:solidFill>
+              <a:prstDash val="solid"/>
+              <a:round/>
+            </a:ln>
+          </p:spPr>
+          <p:txBody>
+            <a:bodyPr/>
+            <a:lstStyle/>
+            <a:p/>
+          </p:txBody>
+        </p:sp>
+        <p:sp>
+          <p:nvSpPr>
+            <p:cNvPr id="70" name="tx70"/>
+            <p:cNvSpPr/>
+            <p:nvPr/>
+          </p:nvSpPr>
+          <p:spPr>
+            <a:xfrm>
+              <a:off x="7654278" y="3474706"/>
+              <a:ext cx="880690" cy="141014"/>
+            </a:xfrm>
+            <a:prstGeom prst="rect">
+              <a:avLst/>
+            </a:prstGeom>
+            <a:noFill/>
+          </p:spPr>
+          <p:txBody>
+            <a:bodyPr lIns="0" rIns="0" tIns="0" bIns="0" anchorCtr="1" anchor="ctr" wrap="none"/>
+            <a:lstStyle/>
+            <a:p>
+              <a:pPr algn="l" marL="0" marR="0" indent="0">
+                <a:lnSpc>
+                  <a:spcPts val="1200"/>
+                </a:lnSpc>
+                <a:spcBef>
+                  <a:spcPts val="0"/>
+                </a:spcBef>
+                <a:spcAft>
+                  <a:spcPts val="0"/>
+                </a:spcAft>
+              </a:pPr>
+              <a:r>
+                <a:rPr sz="1200" b="1">
+                  <a:solidFill>
+                    <a:srgbClr val="000000">
+                      <a:alpha val="100000"/>
+                    </a:srgbClr>
+                  </a:solidFill>
+                  <a:latin typeface="Arial"/>
+                  <a:cs typeface="Arial"/>
+                </a:rPr>
+                <a:t>ODF prechir</a:t>
+              </a:r>
+            </a:p>
+          </p:txBody>
+        </p:sp>
+        <p:sp>
+          <p:nvSpPr>
+            <p:cNvPr id="71" name="rc71"/>
+            <p:cNvSpPr/>
+            <p:nvPr/>
+          </p:nvSpPr>
+          <p:spPr>
+            <a:xfrm>
+              <a:off x="7654278" y="3707672"/>
+              <a:ext cx="219455" cy="219455"/>
+            </a:xfrm>
+            <a:prstGeom prst="rect">
+              <a:avLst/>
+            </a:prstGeom>
+            <a:solidFill>
+              <a:srgbClr val="FFFFFF">
+                <a:alpha val="100000"/>
+              </a:srgbClr>
+            </a:solidFill>
+          </p:spPr>
+          <p:txBody>
+            <a:bodyPr/>
+            <a:lstStyle/>
+            <a:p/>
+          </p:txBody>
+        </p:sp>
+        <p:sp>
+          <p:nvSpPr>
+            <p:cNvPr id="72" name="pl72"/>
+            <p:cNvSpPr/>
+            <p:nvPr/>
+          </p:nvSpPr>
+          <p:spPr>
+            <a:xfrm>
+              <a:off x="7764006" y="3872264"/>
+              <a:ext cx="0" cy="32918"/>
+            </a:xfrm>
+            <a:custGeom>
+              <a:avLst/>
+              <a:pathLst>
+                <a:path w="0" h="32918">
+                  <a:moveTo>
+                    <a:pt x="0" y="32918"/>
+                  </a:moveTo>
+                  <a:lnTo>
+                    <a:pt x="0" y="0"/>
+                  </a:lnTo>
+                </a:path>
+              </a:pathLst>
+            </a:custGeom>
+            <a:ln w="13550" cap="flat">
+              <a:solidFill>
+                <a:srgbClr val="333333">
+                  <a:alpha val="100000"/>
+                </a:srgbClr>
+              </a:solidFill>
+              <a:prstDash val="solid"/>
+              <a:miter/>
+            </a:ln>
+          </p:spPr>
+          <p:txBody>
+            <a:bodyPr/>
+            <a:lstStyle/>
+            <a:p/>
+          </p:txBody>
+        </p:sp>
+        <p:sp>
+          <p:nvSpPr>
+            <p:cNvPr id="73" name="pl73"/>
+            <p:cNvSpPr/>
+            <p:nvPr/>
+          </p:nvSpPr>
+          <p:spPr>
+            <a:xfrm>
+              <a:off x="7764006" y="3729618"/>
+              <a:ext cx="0" cy="32918"/>
+            </a:xfrm>
+            <a:custGeom>
+              <a:avLst/>
+              <a:pathLst>
+                <a:path w="0" h="32918">
+                  <a:moveTo>
+                    <a:pt x="0" y="32918"/>
+                  </a:moveTo>
+                  <a:lnTo>
+                    <a:pt x="0" y="0"/>
+                  </a:lnTo>
+                </a:path>
+              </a:pathLst>
+            </a:custGeom>
+            <a:ln w="13550" cap="flat">
+              <a:solidFill>
+                <a:srgbClr val="333333">
+                  <a:alpha val="100000"/>
+                </a:srgbClr>
+              </a:solidFill>
+              <a:prstDash val="solid"/>
+              <a:miter/>
+            </a:ln>
+          </p:spPr>
+          <p:txBody>
+            <a:bodyPr/>
+            <a:lstStyle/>
+            <a:p/>
+          </p:txBody>
+        </p:sp>
+        <p:sp>
+          <p:nvSpPr>
+            <p:cNvPr id="74" name="rc74"/>
+            <p:cNvSpPr/>
+            <p:nvPr/>
+          </p:nvSpPr>
+          <p:spPr>
+            <a:xfrm>
+              <a:off x="7681710" y="3762536"/>
+              <a:ext cx="164592" cy="109727"/>
+            </a:xfrm>
+            <a:prstGeom prst="rect">
+              <a:avLst/>
+            </a:prstGeom>
+            <a:solidFill>
+              <a:srgbClr val="F8766D">
+                <a:alpha val="100000"/>
+              </a:srgbClr>
+            </a:solidFill>
+            <a:ln w="13550" cap="flat">
+              <a:solidFill>
+                <a:srgbClr val="333333">
+                  <a:alpha val="100000"/>
+                </a:srgbClr>
+              </a:solidFill>
+              <a:prstDash val="solid"/>
+              <a:miter/>
+            </a:ln>
+          </p:spPr>
+          <p:txBody>
+            <a:bodyPr/>
+            <a:lstStyle/>
+            <a:p/>
+          </p:txBody>
+        </p:sp>
+        <p:sp>
+          <p:nvSpPr>
+            <p:cNvPr id="75" name="pl75"/>
+            <p:cNvSpPr/>
+            <p:nvPr/>
+          </p:nvSpPr>
+          <p:spPr>
+            <a:xfrm>
+              <a:off x="7681710" y="3817400"/>
+              <a:ext cx="164591" cy="0"/>
+            </a:xfrm>
+            <a:custGeom>
+              <a:avLst/>
+              <a:pathLst>
+                <a:path w="164591" h="0">
+                  <a:moveTo>
+                    <a:pt x="0" y="0"/>
+                  </a:moveTo>
+                  <a:lnTo>
+                    <a:pt x="164591" y="0"/>
+                  </a:lnTo>
+                </a:path>
+              </a:pathLst>
+            </a:custGeom>
+            <a:ln w="13550" cap="flat">
+              <a:solidFill>
+                <a:srgbClr val="333333">
+                  <a:alpha val="100000"/>
+                </a:srgbClr>
+              </a:solidFill>
+              <a:prstDash val="solid"/>
+              <a:miter/>
+            </a:ln>
+          </p:spPr>
+          <p:txBody>
+            <a:bodyPr/>
+            <a:lstStyle/>
+            <a:p/>
+          </p:txBody>
+        </p:sp>
+        <p:sp>
+          <p:nvSpPr>
+            <p:cNvPr id="76" name="rc76"/>
+            <p:cNvSpPr/>
+            <p:nvPr/>
+          </p:nvSpPr>
+          <p:spPr>
+            <a:xfrm>
+              <a:off x="7654278" y="3927128"/>
+              <a:ext cx="219455" cy="219455"/>
+            </a:xfrm>
+            <a:prstGeom prst="rect">
+              <a:avLst/>
+            </a:prstGeom>
+            <a:solidFill>
+              <a:srgbClr val="FFFFFF">
+                <a:alpha val="100000"/>
+              </a:srgbClr>
+            </a:solidFill>
+          </p:spPr>
+          <p:txBody>
+            <a:bodyPr/>
+            <a:lstStyle/>
+            <a:p/>
+          </p:txBody>
+        </p:sp>
+        <p:sp>
+          <p:nvSpPr>
+            <p:cNvPr id="77" name="pl77"/>
+            <p:cNvSpPr/>
+            <p:nvPr/>
+          </p:nvSpPr>
+          <p:spPr>
+            <a:xfrm>
+              <a:off x="7764006" y="4091720"/>
+              <a:ext cx="0" cy="32918"/>
+            </a:xfrm>
+            <a:custGeom>
+              <a:avLst/>
+              <a:pathLst>
+                <a:path w="0" h="32918">
+                  <a:moveTo>
+                    <a:pt x="0" y="32918"/>
+                  </a:moveTo>
+                  <a:lnTo>
+                    <a:pt x="0" y="0"/>
+                  </a:lnTo>
+                </a:path>
+              </a:pathLst>
+            </a:custGeom>
+            <a:ln w="13550" cap="flat">
+              <a:solidFill>
+                <a:srgbClr val="333333">
+                  <a:alpha val="100000"/>
+                </a:srgbClr>
+              </a:solidFill>
+              <a:prstDash val="solid"/>
+              <a:miter/>
+            </a:ln>
+          </p:spPr>
+          <p:txBody>
+            <a:bodyPr/>
+            <a:lstStyle/>
+            <a:p/>
+          </p:txBody>
+        </p:sp>
+        <p:sp>
+          <p:nvSpPr>
+            <p:cNvPr id="78" name="pl78"/>
+            <p:cNvSpPr/>
+            <p:nvPr/>
+          </p:nvSpPr>
+          <p:spPr>
+            <a:xfrm>
+              <a:off x="7764006" y="3949074"/>
+              <a:ext cx="0" cy="32918"/>
+            </a:xfrm>
+            <a:custGeom>
+              <a:avLst/>
+              <a:pathLst>
+                <a:path w="0" h="32918">
+                  <a:moveTo>
+                    <a:pt x="0" y="32918"/>
+                  </a:moveTo>
+                  <a:lnTo>
+                    <a:pt x="0" y="0"/>
+                  </a:lnTo>
+                </a:path>
+              </a:pathLst>
+            </a:custGeom>
+            <a:ln w="13550" cap="flat">
+              <a:solidFill>
+                <a:srgbClr val="333333">
+                  <a:alpha val="100000"/>
+                </a:srgbClr>
+              </a:solidFill>
+              <a:prstDash val="solid"/>
+              <a:miter/>
+            </a:ln>
+          </p:spPr>
+          <p:txBody>
+            <a:bodyPr/>
+            <a:lstStyle/>
+            <a:p/>
+          </p:txBody>
+        </p:sp>
+        <p:sp>
+          <p:nvSpPr>
+            <p:cNvPr id="79" name="rc79"/>
+            <p:cNvSpPr/>
+            <p:nvPr/>
+          </p:nvSpPr>
+          <p:spPr>
+            <a:xfrm>
+              <a:off x="7681710" y="3981992"/>
+              <a:ext cx="164592" cy="109727"/>
+            </a:xfrm>
+            <a:prstGeom prst="rect">
+              <a:avLst/>
+            </a:prstGeom>
+            <a:solidFill>
+              <a:srgbClr val="00BFC4">
+                <a:alpha val="100000"/>
+              </a:srgbClr>
+            </a:solidFill>
+            <a:ln w="13550" cap="flat">
+              <a:solidFill>
+                <a:srgbClr val="333333">
+                  <a:alpha val="100000"/>
+                </a:srgbClr>
+              </a:solidFill>
+              <a:prstDash val="solid"/>
+              <a:miter/>
+            </a:ln>
+          </p:spPr>
+          <p:txBody>
+            <a:bodyPr/>
+            <a:lstStyle/>
+            <a:p/>
+          </p:txBody>
+        </p:sp>
+        <p:sp>
+          <p:nvSpPr>
+            <p:cNvPr id="80" name="pl80"/>
+            <p:cNvSpPr/>
+            <p:nvPr/>
+          </p:nvSpPr>
+          <p:spPr>
+            <a:xfrm>
+              <a:off x="7681710" y="4036856"/>
+              <a:ext cx="164591" cy="0"/>
+            </a:xfrm>
+            <a:custGeom>
+              <a:avLst/>
+              <a:pathLst>
+                <a:path w="164591" h="0">
+                  <a:moveTo>
+                    <a:pt x="0" y="0"/>
+                  </a:moveTo>
+                  <a:lnTo>
+                    <a:pt x="164591" y="0"/>
+                  </a:lnTo>
+                </a:path>
+              </a:pathLst>
+            </a:custGeom>
+            <a:ln w="13550" cap="flat">
+              <a:solidFill>
+                <a:srgbClr val="333333">
+                  <a:alpha val="100000"/>
+                </a:srgbClr>
+              </a:solidFill>
+              <a:prstDash val="solid"/>
+              <a:miter/>
+            </a:ln>
+          </p:spPr>
+          <p:txBody>
+            <a:bodyPr/>
+            <a:lstStyle/>
+            <a:p/>
+          </p:txBody>
+        </p:sp>
+        <p:sp>
+          <p:nvSpPr>
+            <p:cNvPr id="81" name="tx81"/>
+            <p:cNvSpPr/>
+            <p:nvPr/>
+          </p:nvSpPr>
+          <p:spPr>
+            <a:xfrm>
+              <a:off x="7949650" y="3765286"/>
+              <a:ext cx="77694" cy="102114"/>
+            </a:xfrm>
+            <a:prstGeom prst="rect">
+              <a:avLst/>
+            </a:prstGeom>
+            <a:noFill/>
+          </p:spPr>
+          <p:txBody>
+            <a:bodyPr lIns="0" rIns="0" tIns="0" bIns="0" anchorCtr="1" anchor="ctr" wrap="none"/>
+            <a:lstStyle/>
+            <a:p>
+              <a:pPr algn="l" marL="0" marR="0" indent="0">
+                <a:lnSpc>
+                  <a:spcPts val="1100"/>
+                </a:lnSpc>
+                <a:spcBef>
+                  <a:spcPts val="0"/>
+                </a:spcBef>
+                <a:spcAft>
+                  <a:spcPts val="0"/>
+                </a:spcAft>
+              </a:pPr>
+              <a:r>
+                <a:rPr sz="1100">
+                  <a:solidFill>
+                    <a:srgbClr val="000000">
+                      <a:alpha val="100000"/>
+                    </a:srgbClr>
+                  </a:solidFill>
+                  <a:latin typeface="Arial"/>
+                  <a:cs typeface="Arial"/>
+                </a:rPr>
+                <a:t>0</a:t>
+              </a:r>
+            </a:p>
+          </p:txBody>
+        </p:sp>
+        <p:sp>
+          <p:nvSpPr>
+            <p:cNvPr id="82" name="tx82"/>
+            <p:cNvSpPr/>
+            <p:nvPr/>
+          </p:nvSpPr>
+          <p:spPr>
+            <a:xfrm>
+              <a:off x="7949650" y="3986447"/>
+              <a:ext cx="77694" cy="100409"/>
+            </a:xfrm>
+            <a:prstGeom prst="rect">
+              <a:avLst/>
+            </a:prstGeom>
+            <a:noFill/>
+          </p:spPr>
+          <p:txBody>
+            <a:bodyPr lIns="0" rIns="0" tIns="0" bIns="0" anchorCtr="1" anchor="ctr" wrap="none"/>
+            <a:lstStyle/>
+            <a:p>
+              <a:pPr algn="l" marL="0" marR="0" indent="0">
+                <a:lnSpc>
+                  <a:spcPts val="1100"/>
+                </a:lnSpc>
+                <a:spcBef>
+                  <a:spcPts val="0"/>
+                </a:spcBef>
+                <a:spcAft>
+                  <a:spcPts val="0"/>
+                </a:spcAft>
+              </a:pPr>
+              <a:r>
+                <a:rPr sz="1100">
+                  <a:solidFill>
+                    <a:srgbClr val="000000">
+                      <a:alpha val="100000"/>
+                    </a:srgbClr>
+                  </a:solidFill>
+                  <a:latin typeface="Arial"/>
+                  <a:cs typeface="Arial"/>
+                </a:rPr>
+                <a:t>1</a:t>
+              </a:r>
+            </a:p>
+          </p:txBody>
+        </p:sp>
+        <p:sp>
+          <p:nvSpPr>
+            <p:cNvPr id="83" name="tx83"/>
             <p:cNvSpPr/>
             <p:nvPr/>
           </p:nvSpPr>

</xml_diff>